<commit_message>
Re #1844 instrument view cut
</commit_message>
<xml_diff>
--- a/documentation/presentations/Horace4.1andUserExperience.pptx
+++ b/documentation/presentations/Horace4.1andUserExperience.pptx
@@ -7,6 +7,9 @@
   <p:sldIdLst>
     <p:sldId id="256" r:id="rId2"/>
     <p:sldId id="257" r:id="rId3"/>
+    <p:sldId id="258" r:id="rId4"/>
+    <p:sldId id="259" r:id="rId5"/>
+    <p:sldId id="260" r:id="rId6"/>
   </p:sldIdLst>
   <p:sldSz cx="12192000" cy="6858000"/>
   <p:notesSz cx="6858000" cy="9144000"/>
@@ -5169,6 +5172,1634 @@
     <p:extLst>
       <p:ext uri="{BB962C8B-B14F-4D97-AF65-F5344CB8AC3E}">
         <p14:creationId xmlns:p14="http://schemas.microsoft.com/office/powerpoint/2010/main" val="2587144761"/>
+      </p:ext>
+    </p:extLst>
+  </p:cSld>
+  <p:clrMapOvr>
+    <a:masterClrMapping/>
+  </p:clrMapOvr>
+</p:sld>
+</file>
+
+<file path=ppt/slides/slide3.xml><?xml version="1.0" encoding="utf-8"?>
+<p:sld xmlns:a="http://schemas.openxmlformats.org/drawingml/2006/main" xmlns:r="http://schemas.openxmlformats.org/officeDocument/2006/relationships" xmlns:p="http://schemas.openxmlformats.org/presentationml/2006/main">
+  <p:cSld>
+    <p:spTree>
+      <p:nvGrpSpPr>
+        <p:cNvPr id="1" name="">
+          <a:extLst>
+            <a:ext uri="{FF2B5EF4-FFF2-40B4-BE49-F238E27FC236}">
+              <a16:creationId xmlns:a16="http://schemas.microsoft.com/office/drawing/2014/main" id="{D04A1010-F173-CE70-2B14-6C42B040F185}"/>
+            </a:ext>
+          </a:extLst>
+        </p:cNvPr>
+        <p:cNvGrpSpPr/>
+        <p:nvPr/>
+      </p:nvGrpSpPr>
+      <p:grpSpPr>
+        <a:xfrm>
+          <a:off x="0" y="0"/>
+          <a:ext cx="0" cy="0"/>
+          <a:chOff x="0" y="0"/>
+          <a:chExt cx="0" cy="0"/>
+        </a:xfrm>
+      </p:grpSpPr>
+      <p:pic>
+        <p:nvPicPr>
+          <p:cNvPr id="24" name="Picture 23">
+            <a:extLst>
+              <a:ext uri="{FF2B5EF4-FFF2-40B4-BE49-F238E27FC236}">
+                <a16:creationId xmlns:a16="http://schemas.microsoft.com/office/drawing/2014/main" id="{1DC4329C-02E0-626B-98ED-2A5E25AF4351}"/>
+              </a:ext>
+            </a:extLst>
+          </p:cNvPr>
+          <p:cNvPicPr>
+            <a:picLocks noChangeAspect="1"/>
+          </p:cNvPicPr>
+          <p:nvPr/>
+        </p:nvPicPr>
+        <p:blipFill>
+          <a:blip r:embed="rId2"/>
+          <a:stretch>
+            <a:fillRect/>
+          </a:stretch>
+        </p:blipFill>
+        <p:spPr>
+          <a:xfrm>
+            <a:off x="6884563" y="2772529"/>
+            <a:ext cx="4166102" cy="3124577"/>
+          </a:xfrm>
+          <a:prstGeom prst="rect">
+            <a:avLst/>
+          </a:prstGeom>
+        </p:spPr>
+      </p:pic>
+      <p:sp>
+        <p:nvSpPr>
+          <p:cNvPr id="3" name="Subtitle 2">
+            <a:extLst>
+              <a:ext uri="{FF2B5EF4-FFF2-40B4-BE49-F238E27FC236}">
+                <a16:creationId xmlns:a16="http://schemas.microsoft.com/office/drawing/2014/main" id="{468C8C39-213C-68D9-9DF9-B583DDC9F5B6}"/>
+              </a:ext>
+            </a:extLst>
+          </p:cNvPr>
+          <p:cNvSpPr>
+            <a:spLocks noGrp="1"/>
+          </p:cNvSpPr>
+          <p:nvPr>
+            <p:ph type="subTitle" idx="1"/>
+          </p:nvPr>
+        </p:nvSpPr>
+        <p:spPr>
+          <a:xfrm>
+            <a:off x="624874" y="119847"/>
+            <a:ext cx="10290313" cy="757927"/>
+          </a:xfrm>
+        </p:spPr>
+        <p:txBody>
+          <a:bodyPr>
+            <a:noAutofit/>
+          </a:bodyPr>
+          <a:lstStyle/>
+          <a:p>
+            <a:r>
+              <a:rPr lang="en-GB" sz="2800" dirty="0"/>
+              <a:t>Horace 4 issues from user experience and Horace 4.1 highlights</a:t>
+            </a:r>
+          </a:p>
+        </p:txBody>
+      </p:sp>
+      <p:sp>
+        <p:nvSpPr>
+          <p:cNvPr id="4" name="Subtitle 2">
+            <a:extLst>
+              <a:ext uri="{FF2B5EF4-FFF2-40B4-BE49-F238E27FC236}">
+                <a16:creationId xmlns:a16="http://schemas.microsoft.com/office/drawing/2014/main" id="{8FD02A69-D62A-824E-EBA8-51201EB39F5B}"/>
+              </a:ext>
+            </a:extLst>
+          </p:cNvPr>
+          <p:cNvSpPr txBox="1">
+            <a:spLocks/>
+          </p:cNvSpPr>
+          <p:nvPr/>
+        </p:nvSpPr>
+        <p:spPr>
+          <a:xfrm>
+            <a:off x="490329" y="759324"/>
+            <a:ext cx="10290313" cy="516835"/>
+          </a:xfrm>
+          <a:prstGeom prst="rect">
+            <a:avLst/>
+          </a:prstGeom>
+        </p:spPr>
+        <p:txBody>
+          <a:bodyPr vert="horz" lIns="91440" tIns="45720" rIns="91440" bIns="45720" rtlCol="0">
+            <a:noAutofit/>
+          </a:bodyPr>
+          <a:lstStyle>
+            <a:lvl1pPr marL="0" indent="0" algn="ctr" defTabSz="914400" rtl="0" eaLnBrk="1" latinLnBrk="0" hangingPunct="1">
+              <a:lnSpc>
+                <a:spcPct val="90000"/>
+              </a:lnSpc>
+              <a:spcBef>
+                <a:spcPts val="1000"/>
+              </a:spcBef>
+              <a:buFont typeface="Arial" panose="020B0604020202020204" pitchFamily="34" charset="0"/>
+              <a:buNone/>
+              <a:defRPr sz="2400" kern="1200">
+                <a:solidFill>
+                  <a:schemeClr val="tx1"/>
+                </a:solidFill>
+                <a:latin typeface="+mn-lt"/>
+                <a:ea typeface="+mn-ea"/>
+                <a:cs typeface="+mn-cs"/>
+              </a:defRPr>
+            </a:lvl1pPr>
+            <a:lvl2pPr marL="457200" indent="0" algn="ctr" defTabSz="914400" rtl="0" eaLnBrk="1" latinLnBrk="0" hangingPunct="1">
+              <a:lnSpc>
+                <a:spcPct val="90000"/>
+              </a:lnSpc>
+              <a:spcBef>
+                <a:spcPts val="500"/>
+              </a:spcBef>
+              <a:buFont typeface="Arial" panose="020B0604020202020204" pitchFamily="34" charset="0"/>
+              <a:buNone/>
+              <a:defRPr sz="2000" kern="1200">
+                <a:solidFill>
+                  <a:schemeClr val="tx1"/>
+                </a:solidFill>
+                <a:latin typeface="+mn-lt"/>
+                <a:ea typeface="+mn-ea"/>
+                <a:cs typeface="+mn-cs"/>
+              </a:defRPr>
+            </a:lvl2pPr>
+            <a:lvl3pPr marL="914400" indent="0" algn="ctr" defTabSz="914400" rtl="0" eaLnBrk="1" latinLnBrk="0" hangingPunct="1">
+              <a:lnSpc>
+                <a:spcPct val="90000"/>
+              </a:lnSpc>
+              <a:spcBef>
+                <a:spcPts val="500"/>
+              </a:spcBef>
+              <a:buFont typeface="Arial" panose="020B0604020202020204" pitchFamily="34" charset="0"/>
+              <a:buNone/>
+              <a:defRPr sz="1800" kern="1200">
+                <a:solidFill>
+                  <a:schemeClr val="tx1"/>
+                </a:solidFill>
+                <a:latin typeface="+mn-lt"/>
+                <a:ea typeface="+mn-ea"/>
+                <a:cs typeface="+mn-cs"/>
+              </a:defRPr>
+            </a:lvl3pPr>
+            <a:lvl4pPr marL="1371600" indent="0" algn="ctr" defTabSz="914400" rtl="0" eaLnBrk="1" latinLnBrk="0" hangingPunct="1">
+              <a:lnSpc>
+                <a:spcPct val="90000"/>
+              </a:lnSpc>
+              <a:spcBef>
+                <a:spcPts val="500"/>
+              </a:spcBef>
+              <a:buFont typeface="Arial" panose="020B0604020202020204" pitchFamily="34" charset="0"/>
+              <a:buNone/>
+              <a:defRPr sz="1600" kern="1200">
+                <a:solidFill>
+                  <a:schemeClr val="tx1"/>
+                </a:solidFill>
+                <a:latin typeface="+mn-lt"/>
+                <a:ea typeface="+mn-ea"/>
+                <a:cs typeface="+mn-cs"/>
+              </a:defRPr>
+            </a:lvl4pPr>
+            <a:lvl5pPr marL="1828800" indent="0" algn="ctr" defTabSz="914400" rtl="0" eaLnBrk="1" latinLnBrk="0" hangingPunct="1">
+              <a:lnSpc>
+                <a:spcPct val="90000"/>
+              </a:lnSpc>
+              <a:spcBef>
+                <a:spcPts val="500"/>
+              </a:spcBef>
+              <a:buFont typeface="Arial" panose="020B0604020202020204" pitchFamily="34" charset="0"/>
+              <a:buNone/>
+              <a:defRPr sz="1600" kern="1200">
+                <a:solidFill>
+                  <a:schemeClr val="tx1"/>
+                </a:solidFill>
+                <a:latin typeface="+mn-lt"/>
+                <a:ea typeface="+mn-ea"/>
+                <a:cs typeface="+mn-cs"/>
+              </a:defRPr>
+            </a:lvl5pPr>
+            <a:lvl6pPr marL="2286000" indent="0" algn="ctr" defTabSz="914400" rtl="0" eaLnBrk="1" latinLnBrk="0" hangingPunct="1">
+              <a:lnSpc>
+                <a:spcPct val="90000"/>
+              </a:lnSpc>
+              <a:spcBef>
+                <a:spcPts val="500"/>
+              </a:spcBef>
+              <a:buFont typeface="Arial" panose="020B0604020202020204" pitchFamily="34" charset="0"/>
+              <a:buNone/>
+              <a:defRPr sz="1600" kern="1200">
+                <a:solidFill>
+                  <a:schemeClr val="tx1"/>
+                </a:solidFill>
+                <a:latin typeface="+mn-lt"/>
+                <a:ea typeface="+mn-ea"/>
+                <a:cs typeface="+mn-cs"/>
+              </a:defRPr>
+            </a:lvl6pPr>
+            <a:lvl7pPr marL="2743200" indent="0" algn="ctr" defTabSz="914400" rtl="0" eaLnBrk="1" latinLnBrk="0" hangingPunct="1">
+              <a:lnSpc>
+                <a:spcPct val="90000"/>
+              </a:lnSpc>
+              <a:spcBef>
+                <a:spcPts val="500"/>
+              </a:spcBef>
+              <a:buFont typeface="Arial" panose="020B0604020202020204" pitchFamily="34" charset="0"/>
+              <a:buNone/>
+              <a:defRPr sz="1600" kern="1200">
+                <a:solidFill>
+                  <a:schemeClr val="tx1"/>
+                </a:solidFill>
+                <a:latin typeface="+mn-lt"/>
+                <a:ea typeface="+mn-ea"/>
+                <a:cs typeface="+mn-cs"/>
+              </a:defRPr>
+            </a:lvl7pPr>
+            <a:lvl8pPr marL="3200400" indent="0" algn="ctr" defTabSz="914400" rtl="0" eaLnBrk="1" latinLnBrk="0" hangingPunct="1">
+              <a:lnSpc>
+                <a:spcPct val="90000"/>
+              </a:lnSpc>
+              <a:spcBef>
+                <a:spcPts val="500"/>
+              </a:spcBef>
+              <a:buFont typeface="Arial" panose="020B0604020202020204" pitchFamily="34" charset="0"/>
+              <a:buNone/>
+              <a:defRPr sz="1600" kern="1200">
+                <a:solidFill>
+                  <a:schemeClr val="tx1"/>
+                </a:solidFill>
+                <a:latin typeface="+mn-lt"/>
+                <a:ea typeface="+mn-ea"/>
+                <a:cs typeface="+mn-cs"/>
+              </a:defRPr>
+            </a:lvl8pPr>
+            <a:lvl9pPr marL="3657600" indent="0" algn="ctr" defTabSz="914400" rtl="0" eaLnBrk="1" latinLnBrk="0" hangingPunct="1">
+              <a:lnSpc>
+                <a:spcPct val="90000"/>
+              </a:lnSpc>
+              <a:spcBef>
+                <a:spcPts val="500"/>
+              </a:spcBef>
+              <a:buFont typeface="Arial" panose="020B0604020202020204" pitchFamily="34" charset="0"/>
+              <a:buNone/>
+              <a:defRPr sz="1600" kern="1200">
+                <a:solidFill>
+                  <a:schemeClr val="tx1"/>
+                </a:solidFill>
+                <a:latin typeface="+mn-lt"/>
+                <a:ea typeface="+mn-ea"/>
+                <a:cs typeface="+mn-cs"/>
+              </a:defRPr>
+            </a:lvl9pPr>
+          </a:lstStyle>
+          <a:p>
+            <a:pPr algn="l"/>
+            <a:r>
+              <a:rPr lang="en-GB" sz="2800" dirty="0">
+                <a:solidFill>
+                  <a:srgbClr val="0070C0"/>
+                </a:solidFill>
+              </a:rPr>
+              <a:t>Data Diagnostics: </a:t>
+            </a:r>
+            <a:r>
+              <a:rPr lang="en-GB" sz="2800" b="1" dirty="0"/>
+              <a:t>Instrument view cut</a:t>
+            </a:r>
+          </a:p>
+          <a:p>
+            <a:pPr algn="l"/>
+            <a:endParaRPr lang="en-GB" sz="2800" dirty="0">
+              <a:solidFill>
+                <a:srgbClr val="0070C0"/>
+              </a:solidFill>
+            </a:endParaRPr>
+          </a:p>
+        </p:txBody>
+      </p:sp>
+      <p:sp>
+        <p:nvSpPr>
+          <p:cNvPr id="9" name="Rectangle 1">
+            <a:extLst>
+              <a:ext uri="{FF2B5EF4-FFF2-40B4-BE49-F238E27FC236}">
+                <a16:creationId xmlns:a16="http://schemas.microsoft.com/office/drawing/2014/main" id="{4840AC4D-90C9-01FB-F49A-5014CAD6344C}"/>
+              </a:ext>
+            </a:extLst>
+          </p:cNvPr>
+          <p:cNvSpPr>
+            <a:spLocks noChangeArrowheads="1"/>
+          </p:cNvSpPr>
+          <p:nvPr/>
+        </p:nvSpPr>
+        <p:spPr bwMode="auto">
+          <a:xfrm>
+            <a:off x="375105" y="1390772"/>
+            <a:ext cx="137204173" cy="1477328"/>
+          </a:xfrm>
+          <a:prstGeom prst="rect">
+            <a:avLst/>
+          </a:prstGeom>
+          <a:noFill/>
+          <a:ln>
+            <a:noFill/>
+          </a:ln>
+          <a:effectLst/>
+          <a:extLst>
+            <a:ext uri="{909E8E84-426E-40DD-AFC4-6F175D3DCCD1}">
+              <a14:hiddenFill xmlns:a14="http://schemas.microsoft.com/office/drawing/2010/main">
+                <a:solidFill>
+                  <a:schemeClr val="accent1"/>
+                </a:solidFill>
+              </a14:hiddenFill>
+            </a:ext>
+            <a:ext uri="{91240B29-F687-4F45-9708-019B960494DF}">
+              <a14:hiddenLine xmlns:a14="http://schemas.microsoft.com/office/drawing/2010/main" w="9525">
+                <a:solidFill>
+                  <a:schemeClr val="tx1"/>
+                </a:solidFill>
+                <a:miter lim="800000"/>
+                <a:headEnd/>
+                <a:tailEnd/>
+              </a14:hiddenLine>
+            </a:ext>
+            <a:ext uri="{AF507438-7753-43E0-B8FC-AC1667EBCBE1}">
+              <a14:hiddenEffects xmlns:a14="http://schemas.microsoft.com/office/drawing/2010/main">
+                <a:effectLst>
+                  <a:outerShdw dist="35921" dir="2700000" algn="ctr" rotWithShape="0">
+                    <a:schemeClr val="bg2"/>
+                  </a:outerShdw>
+                </a:effectLst>
+              </a14:hiddenEffects>
+            </a:ext>
+          </a:extLst>
+        </p:spPr>
+        <p:txBody>
+          <a:bodyPr vert="horz" wrap="square" lIns="91440" tIns="45720" rIns="91440" bIns="45720" numCol="1" anchor="ctr" anchorCtr="0" compatLnSpc="1">
+            <a:prstTxWarp prst="textNoShape">
+              <a:avLst/>
+            </a:prstTxWarp>
+            <a:spAutoFit/>
+          </a:bodyPr>
+          <a:lstStyle/>
+          <a:p>
+            <a:pPr marL="0" marR="0" lvl="0" indent="0" algn="l" defTabSz="914400" rtl="0" eaLnBrk="0" fontAlgn="base" latinLnBrk="0" hangingPunct="0">
+              <a:lnSpc>
+                <a:spcPct val="100000"/>
+              </a:lnSpc>
+              <a:spcBef>
+                <a:spcPct val="0"/>
+              </a:spcBef>
+              <a:spcAft>
+                <a:spcPct val="0"/>
+              </a:spcAft>
+              <a:buClrTx/>
+              <a:buSzTx/>
+              <a:buFontTx/>
+              <a:buNone/>
+              <a:tabLst/>
+            </a:pPr>
+            <a:r>
+              <a:rPr kumimoji="0" lang="en-US" altLang="en-US" sz="1800" b="0" i="0" u="none" strike="noStrike" cap="none" normalizeH="0" baseline="0" dirty="0">
+                <a:ln>
+                  <a:noFill/>
+                </a:ln>
+                <a:solidFill>
+                  <a:schemeClr val="tx1"/>
+                </a:solidFill>
+                <a:effectLst/>
+                <a:latin typeface="Arial" panose="020B0604020202020204" pitchFamily="34" charset="0"/>
+              </a:rPr>
+              <a:t>Normally Horace works with scattering function build in reciprocal coordinate system related to a crystal.</a:t>
+            </a:r>
+          </a:p>
+          <a:p>
+            <a:pPr marL="0" marR="0" lvl="0" indent="0" algn="l" defTabSz="914400" rtl="0" eaLnBrk="0" fontAlgn="base" latinLnBrk="0" hangingPunct="0">
+              <a:lnSpc>
+                <a:spcPct val="100000"/>
+              </a:lnSpc>
+              <a:spcBef>
+                <a:spcPct val="0"/>
+              </a:spcBef>
+              <a:spcAft>
+                <a:spcPct val="0"/>
+              </a:spcAft>
+              <a:buClrTx/>
+              <a:buSzTx/>
+              <a:buFontTx/>
+              <a:buNone/>
+              <a:tabLst/>
+            </a:pPr>
+            <a:r>
+              <a:rPr kumimoji="0" lang="en-US" altLang="en-US" sz="1800" b="0" i="0" u="none" strike="noStrike" cap="none" normalizeH="0" baseline="0" dirty="0">
+                <a:ln>
+                  <a:noFill/>
+                </a:ln>
+                <a:solidFill>
+                  <a:schemeClr val="tx1"/>
+                </a:solidFill>
+                <a:effectLst/>
+                <a:latin typeface="Arial" panose="020B0604020202020204" pitchFamily="34" charset="0"/>
+              </a:rPr>
+              <a:t>If sample is not sufficiently large to allow neutrons thermalization or instrument have various problems with</a:t>
+            </a:r>
+          </a:p>
+          <a:p>
+            <a:pPr marL="0" marR="0" lvl="0" indent="0" algn="l" defTabSz="914400" rtl="0" eaLnBrk="0" fontAlgn="base" latinLnBrk="0" hangingPunct="0">
+              <a:lnSpc>
+                <a:spcPct val="100000"/>
+              </a:lnSpc>
+              <a:spcBef>
+                <a:spcPct val="0"/>
+              </a:spcBef>
+              <a:spcAft>
+                <a:spcPct val="0"/>
+              </a:spcAft>
+              <a:buClrTx/>
+              <a:buSzTx/>
+              <a:buFontTx/>
+              <a:buNone/>
+              <a:tabLst/>
+            </a:pPr>
+            <a:r>
+              <a:rPr kumimoji="0" lang="en-US" altLang="en-US" sz="1800" b="0" i="0" u="none" strike="noStrike" cap="none" normalizeH="0" baseline="0" dirty="0">
+                <a:ln>
+                  <a:noFill/>
+                </a:ln>
+                <a:solidFill>
+                  <a:schemeClr val="tx1"/>
+                </a:solidFill>
+                <a:effectLst/>
+                <a:latin typeface="Arial" panose="020B0604020202020204" pitchFamily="34" charset="0"/>
+              </a:rPr>
+              <a:t> its detectors or background scattering, some scattering artefacts may add noise or unrelated signals to</a:t>
+            </a:r>
+          </a:p>
+          <a:p>
+            <a:pPr marL="0" marR="0" lvl="0" indent="0" algn="l" defTabSz="914400" rtl="0" eaLnBrk="0" fontAlgn="base" latinLnBrk="0" hangingPunct="0">
+              <a:lnSpc>
+                <a:spcPct val="100000"/>
+              </a:lnSpc>
+              <a:spcBef>
+                <a:spcPct val="0"/>
+              </a:spcBef>
+              <a:spcAft>
+                <a:spcPct val="0"/>
+              </a:spcAft>
+              <a:buClrTx/>
+              <a:buSzTx/>
+              <a:buFontTx/>
+              <a:buNone/>
+              <a:tabLst/>
+            </a:pPr>
+            <a:r>
+              <a:rPr kumimoji="0" lang="en-US" altLang="en-US" sz="1800" b="0" i="0" u="none" strike="noStrike" cap="none" normalizeH="0" baseline="0" dirty="0">
+                <a:ln>
+                  <a:noFill/>
+                </a:ln>
+                <a:solidFill>
+                  <a:schemeClr val="tx1"/>
+                </a:solidFill>
+                <a:effectLst/>
+                <a:latin typeface="Arial" panose="020B0604020202020204" pitchFamily="34" charset="0"/>
+              </a:rPr>
+              <a:t>measured function. These artefacts will have spherical symmetry around the beam direction. </a:t>
+            </a:r>
+          </a:p>
+          <a:p>
+            <a:pPr marL="0" marR="0" lvl="0" indent="0" algn="l" defTabSz="914400" rtl="0" eaLnBrk="0" fontAlgn="base" latinLnBrk="0" hangingPunct="0">
+              <a:lnSpc>
+                <a:spcPct val="100000"/>
+              </a:lnSpc>
+              <a:spcBef>
+                <a:spcPct val="0"/>
+              </a:spcBef>
+              <a:spcAft>
+                <a:spcPct val="0"/>
+              </a:spcAft>
+              <a:buClrTx/>
+              <a:buSzTx/>
+              <a:buFontTx/>
+              <a:buNone/>
+              <a:tabLst/>
+            </a:pPr>
+            <a:r>
+              <a:rPr kumimoji="0" lang="en-US" altLang="en-US" sz="1800" b="0" i="0" u="none" strike="noStrike" cap="none" normalizeH="0" baseline="0" dirty="0">
+                <a:ln>
+                  <a:noFill/>
+                </a:ln>
+                <a:solidFill>
+                  <a:schemeClr val="tx1"/>
+                </a:solidFill>
+                <a:effectLst/>
+                <a:latin typeface="Arial" panose="020B0604020202020204" pitchFamily="34" charset="0"/>
+              </a:rPr>
+              <a:t>To clearly identify such artefacts one may use </a:t>
+            </a:r>
+            <a:r>
+              <a:rPr kumimoji="0" lang="en-US" altLang="en-US" sz="1800" b="1" i="0" u="none" strike="noStrike" cap="none" normalizeH="0" baseline="0" dirty="0" err="1">
+                <a:ln>
+                  <a:noFill/>
+                </a:ln>
+                <a:solidFill>
+                  <a:schemeClr val="tx1"/>
+                </a:solidFill>
+                <a:effectLst/>
+                <a:latin typeface="Arial" panose="020B0604020202020204" pitchFamily="34" charset="0"/>
+              </a:rPr>
+              <a:t>instrument_view_cut</a:t>
+            </a:r>
+            <a:endParaRPr kumimoji="0" lang="en-US" altLang="en-US" sz="1800" b="1" i="0" u="none" strike="noStrike" cap="none" normalizeH="0" baseline="0" dirty="0">
+              <a:ln>
+                <a:noFill/>
+              </a:ln>
+              <a:solidFill>
+                <a:schemeClr val="tx1"/>
+              </a:solidFill>
+              <a:effectLst/>
+              <a:latin typeface="Arial" panose="020B0604020202020204" pitchFamily="34" charset="0"/>
+            </a:endParaRPr>
+          </a:p>
+        </p:txBody>
+      </p:sp>
+      <p:pic>
+        <p:nvPicPr>
+          <p:cNvPr id="16" name="Content Placeholder 4" descr="A blue and green squares&#10;&#10;AI-generated content may be incorrect.">
+            <a:extLst>
+              <a:ext uri="{FF2B5EF4-FFF2-40B4-BE49-F238E27FC236}">
+                <a16:creationId xmlns:a16="http://schemas.microsoft.com/office/drawing/2014/main" id="{55A0A19C-EB8D-77CC-3CA7-221E61DB601D}"/>
+              </a:ext>
+            </a:extLst>
+          </p:cNvPr>
+          <p:cNvPicPr>
+            <a:picLocks noGrp="1" noChangeAspect="1"/>
+          </p:cNvPicPr>
+          <p:nvPr/>
+        </p:nvPicPr>
+        <p:blipFill>
+          <a:blip r:embed="rId3">
+            <a:extLst>
+              <a:ext uri="{28A0092B-C50C-407E-A947-70E740481C1C}">
+                <a14:useLocalDpi xmlns:a14="http://schemas.microsoft.com/office/drawing/2010/main" val="0"/>
+              </a:ext>
+            </a:extLst>
+          </a:blip>
+          <a:stretch>
+            <a:fillRect/>
+          </a:stretch>
+        </p:blipFill>
+        <p:spPr>
+          <a:xfrm>
+            <a:off x="375105" y="2294903"/>
+            <a:ext cx="5530804" cy="3989527"/>
+          </a:xfrm>
+          <a:prstGeom prst="rect">
+            <a:avLst/>
+          </a:prstGeom>
+        </p:spPr>
+      </p:pic>
+      <p:sp>
+        <p:nvSpPr>
+          <p:cNvPr id="23" name="Rectangle 22">
+            <a:extLst>
+              <a:ext uri="{FF2B5EF4-FFF2-40B4-BE49-F238E27FC236}">
+                <a16:creationId xmlns:a16="http://schemas.microsoft.com/office/drawing/2014/main" id="{F65B20A5-E9CB-B2FC-FFC0-7FE79700E99C}"/>
+              </a:ext>
+            </a:extLst>
+          </p:cNvPr>
+          <p:cNvSpPr/>
+          <p:nvPr/>
+        </p:nvSpPr>
+        <p:spPr>
+          <a:xfrm>
+            <a:off x="380906" y="5897106"/>
+            <a:ext cx="10778247" cy="776048"/>
+          </a:xfrm>
+          <a:prstGeom prst="rect">
+            <a:avLst/>
+          </a:prstGeom>
+          <a:solidFill>
+            <a:schemeClr val="bg1"/>
+          </a:solidFill>
+        </p:spPr>
+        <p:style>
+          <a:lnRef idx="2">
+            <a:schemeClr val="accent1">
+              <a:shade val="15000"/>
+            </a:schemeClr>
+          </a:lnRef>
+          <a:fillRef idx="1">
+            <a:schemeClr val="accent1"/>
+          </a:fillRef>
+          <a:effectRef idx="0">
+            <a:schemeClr val="accent1"/>
+          </a:effectRef>
+          <a:fontRef idx="minor">
+            <a:schemeClr val="lt1"/>
+          </a:fontRef>
+        </p:style>
+        <p:txBody>
+          <a:bodyPr rtlCol="0" anchor="ctr"/>
+          <a:lstStyle/>
+          <a:p>
+            <a:pPr algn="ctr"/>
+            <a:r>
+              <a:rPr lang="en-GB" u="sng" dirty="0">
+                <a:solidFill>
+                  <a:srgbClr val="0070C0"/>
+                </a:solidFill>
+              </a:rPr>
+              <a:t>https://abuts.github.io/Horace/v4.1.0/manual/Data_diagnostics.html#instrument-view-cut</a:t>
+            </a:r>
+          </a:p>
+        </p:txBody>
+      </p:sp>
+      <p:sp>
+        <p:nvSpPr>
+          <p:cNvPr id="25" name="Rectangle 24">
+            <a:extLst>
+              <a:ext uri="{FF2B5EF4-FFF2-40B4-BE49-F238E27FC236}">
+                <a16:creationId xmlns:a16="http://schemas.microsoft.com/office/drawing/2014/main" id="{194BBBC6-748A-8A9D-55B2-4C9EC383F1A3}"/>
+              </a:ext>
+            </a:extLst>
+          </p:cNvPr>
+          <p:cNvSpPr/>
+          <p:nvPr/>
+        </p:nvSpPr>
+        <p:spPr>
+          <a:xfrm>
+            <a:off x="3744205" y="5121058"/>
+            <a:ext cx="2896428" cy="776048"/>
+          </a:xfrm>
+          <a:prstGeom prst="rect">
+            <a:avLst/>
+          </a:prstGeom>
+          <a:solidFill>
+            <a:srgbClr val="F15B69"/>
+          </a:solidFill>
+        </p:spPr>
+        <p:style>
+          <a:lnRef idx="2">
+            <a:schemeClr val="accent1">
+              <a:shade val="15000"/>
+            </a:schemeClr>
+          </a:lnRef>
+          <a:fillRef idx="1">
+            <a:schemeClr val="accent1"/>
+          </a:fillRef>
+          <a:effectRef idx="0">
+            <a:schemeClr val="accent1"/>
+          </a:effectRef>
+          <a:fontRef idx="minor">
+            <a:schemeClr val="lt1"/>
+          </a:fontRef>
+        </p:style>
+        <p:txBody>
+          <a:bodyPr rtlCol="0" anchor="ctr"/>
+          <a:lstStyle/>
+          <a:p>
+            <a:pPr algn="ctr"/>
+            <a:r>
+              <a:rPr lang="en-GB" dirty="0">
+                <a:solidFill>
+                  <a:schemeClr val="tx1"/>
+                </a:solidFill>
+              </a:rPr>
+              <a:t>Full SQW object operation</a:t>
+            </a:r>
+          </a:p>
+        </p:txBody>
+      </p:sp>
+    </p:spTree>
+    <p:extLst>
+      <p:ext uri="{BB962C8B-B14F-4D97-AF65-F5344CB8AC3E}">
+        <p14:creationId xmlns:p14="http://schemas.microsoft.com/office/powerpoint/2010/main" val="2398857213"/>
+      </p:ext>
+    </p:extLst>
+  </p:cSld>
+  <p:clrMapOvr>
+    <a:masterClrMapping/>
+  </p:clrMapOvr>
+</p:sld>
+</file>
+
+<file path=ppt/slides/slide4.xml><?xml version="1.0" encoding="utf-8"?>
+<p:sld xmlns:a="http://schemas.openxmlformats.org/drawingml/2006/main" xmlns:r="http://schemas.openxmlformats.org/officeDocument/2006/relationships" xmlns:p="http://schemas.openxmlformats.org/presentationml/2006/main">
+  <p:cSld>
+    <p:spTree>
+      <p:nvGrpSpPr>
+        <p:cNvPr id="1" name="">
+          <a:extLst>
+            <a:ext uri="{FF2B5EF4-FFF2-40B4-BE49-F238E27FC236}">
+              <a16:creationId xmlns:a16="http://schemas.microsoft.com/office/drawing/2014/main" id="{58BFB0A4-F9A4-1E2D-6DAD-76CA0585C34D}"/>
+            </a:ext>
+          </a:extLst>
+        </p:cNvPr>
+        <p:cNvGrpSpPr/>
+        <p:nvPr/>
+      </p:nvGrpSpPr>
+      <p:grpSpPr>
+        <a:xfrm>
+          <a:off x="0" y="0"/>
+          <a:ext cx="0" cy="0"/>
+          <a:chOff x="0" y="0"/>
+          <a:chExt cx="0" cy="0"/>
+        </a:xfrm>
+      </p:grpSpPr>
+      <p:sp>
+        <p:nvSpPr>
+          <p:cNvPr id="3" name="Subtitle 2">
+            <a:extLst>
+              <a:ext uri="{FF2B5EF4-FFF2-40B4-BE49-F238E27FC236}">
+                <a16:creationId xmlns:a16="http://schemas.microsoft.com/office/drawing/2014/main" id="{E464A574-DBC2-9A3A-48C0-5F2F90F287E3}"/>
+              </a:ext>
+            </a:extLst>
+          </p:cNvPr>
+          <p:cNvSpPr>
+            <a:spLocks noGrp="1"/>
+          </p:cNvSpPr>
+          <p:nvPr>
+            <p:ph type="subTitle" idx="1"/>
+          </p:nvPr>
+        </p:nvSpPr>
+        <p:spPr>
+          <a:xfrm>
+            <a:off x="624874" y="119847"/>
+            <a:ext cx="10290313" cy="757927"/>
+          </a:xfrm>
+        </p:spPr>
+        <p:txBody>
+          <a:bodyPr>
+            <a:noAutofit/>
+          </a:bodyPr>
+          <a:lstStyle/>
+          <a:p>
+            <a:r>
+              <a:rPr lang="en-GB" sz="2800" dirty="0"/>
+              <a:t>Horace 4 issues from user experience and Horace 4.1 highlights</a:t>
+            </a:r>
+          </a:p>
+        </p:txBody>
+      </p:sp>
+      <p:sp>
+        <p:nvSpPr>
+          <p:cNvPr id="4" name="Subtitle 2">
+            <a:extLst>
+              <a:ext uri="{FF2B5EF4-FFF2-40B4-BE49-F238E27FC236}">
+                <a16:creationId xmlns:a16="http://schemas.microsoft.com/office/drawing/2014/main" id="{CCDA12CA-289F-CF94-0059-346AFE6207E0}"/>
+              </a:ext>
+            </a:extLst>
+          </p:cNvPr>
+          <p:cNvSpPr txBox="1">
+            <a:spLocks/>
+          </p:cNvSpPr>
+          <p:nvPr/>
+        </p:nvSpPr>
+        <p:spPr>
+          <a:xfrm>
+            <a:off x="490329" y="759324"/>
+            <a:ext cx="11427868" cy="516835"/>
+          </a:xfrm>
+          <a:prstGeom prst="rect">
+            <a:avLst/>
+          </a:prstGeom>
+        </p:spPr>
+        <p:txBody>
+          <a:bodyPr vert="horz" lIns="91440" tIns="45720" rIns="91440" bIns="45720" rtlCol="0">
+            <a:noAutofit/>
+          </a:bodyPr>
+          <a:lstStyle>
+            <a:lvl1pPr marL="0" indent="0" algn="ctr" defTabSz="914400" rtl="0" eaLnBrk="1" latinLnBrk="0" hangingPunct="1">
+              <a:lnSpc>
+                <a:spcPct val="90000"/>
+              </a:lnSpc>
+              <a:spcBef>
+                <a:spcPts val="1000"/>
+              </a:spcBef>
+              <a:buFont typeface="Arial" panose="020B0604020202020204" pitchFamily="34" charset="0"/>
+              <a:buNone/>
+              <a:defRPr sz="2400" kern="1200">
+                <a:solidFill>
+                  <a:schemeClr val="tx1"/>
+                </a:solidFill>
+                <a:latin typeface="+mn-lt"/>
+                <a:ea typeface="+mn-ea"/>
+                <a:cs typeface="+mn-cs"/>
+              </a:defRPr>
+            </a:lvl1pPr>
+            <a:lvl2pPr marL="457200" indent="0" algn="ctr" defTabSz="914400" rtl="0" eaLnBrk="1" latinLnBrk="0" hangingPunct="1">
+              <a:lnSpc>
+                <a:spcPct val="90000"/>
+              </a:lnSpc>
+              <a:spcBef>
+                <a:spcPts val="500"/>
+              </a:spcBef>
+              <a:buFont typeface="Arial" panose="020B0604020202020204" pitchFamily="34" charset="0"/>
+              <a:buNone/>
+              <a:defRPr sz="2000" kern="1200">
+                <a:solidFill>
+                  <a:schemeClr val="tx1"/>
+                </a:solidFill>
+                <a:latin typeface="+mn-lt"/>
+                <a:ea typeface="+mn-ea"/>
+                <a:cs typeface="+mn-cs"/>
+              </a:defRPr>
+            </a:lvl2pPr>
+            <a:lvl3pPr marL="914400" indent="0" algn="ctr" defTabSz="914400" rtl="0" eaLnBrk="1" latinLnBrk="0" hangingPunct="1">
+              <a:lnSpc>
+                <a:spcPct val="90000"/>
+              </a:lnSpc>
+              <a:spcBef>
+                <a:spcPts val="500"/>
+              </a:spcBef>
+              <a:buFont typeface="Arial" panose="020B0604020202020204" pitchFamily="34" charset="0"/>
+              <a:buNone/>
+              <a:defRPr sz="1800" kern="1200">
+                <a:solidFill>
+                  <a:schemeClr val="tx1"/>
+                </a:solidFill>
+                <a:latin typeface="+mn-lt"/>
+                <a:ea typeface="+mn-ea"/>
+                <a:cs typeface="+mn-cs"/>
+              </a:defRPr>
+            </a:lvl3pPr>
+            <a:lvl4pPr marL="1371600" indent="0" algn="ctr" defTabSz="914400" rtl="0" eaLnBrk="1" latinLnBrk="0" hangingPunct="1">
+              <a:lnSpc>
+                <a:spcPct val="90000"/>
+              </a:lnSpc>
+              <a:spcBef>
+                <a:spcPts val="500"/>
+              </a:spcBef>
+              <a:buFont typeface="Arial" panose="020B0604020202020204" pitchFamily="34" charset="0"/>
+              <a:buNone/>
+              <a:defRPr sz="1600" kern="1200">
+                <a:solidFill>
+                  <a:schemeClr val="tx1"/>
+                </a:solidFill>
+                <a:latin typeface="+mn-lt"/>
+                <a:ea typeface="+mn-ea"/>
+                <a:cs typeface="+mn-cs"/>
+              </a:defRPr>
+            </a:lvl4pPr>
+            <a:lvl5pPr marL="1828800" indent="0" algn="ctr" defTabSz="914400" rtl="0" eaLnBrk="1" latinLnBrk="0" hangingPunct="1">
+              <a:lnSpc>
+                <a:spcPct val="90000"/>
+              </a:lnSpc>
+              <a:spcBef>
+                <a:spcPts val="500"/>
+              </a:spcBef>
+              <a:buFont typeface="Arial" panose="020B0604020202020204" pitchFamily="34" charset="0"/>
+              <a:buNone/>
+              <a:defRPr sz="1600" kern="1200">
+                <a:solidFill>
+                  <a:schemeClr val="tx1"/>
+                </a:solidFill>
+                <a:latin typeface="+mn-lt"/>
+                <a:ea typeface="+mn-ea"/>
+                <a:cs typeface="+mn-cs"/>
+              </a:defRPr>
+            </a:lvl5pPr>
+            <a:lvl6pPr marL="2286000" indent="0" algn="ctr" defTabSz="914400" rtl="0" eaLnBrk="1" latinLnBrk="0" hangingPunct="1">
+              <a:lnSpc>
+                <a:spcPct val="90000"/>
+              </a:lnSpc>
+              <a:spcBef>
+                <a:spcPts val="500"/>
+              </a:spcBef>
+              <a:buFont typeface="Arial" panose="020B0604020202020204" pitchFamily="34" charset="0"/>
+              <a:buNone/>
+              <a:defRPr sz="1600" kern="1200">
+                <a:solidFill>
+                  <a:schemeClr val="tx1"/>
+                </a:solidFill>
+                <a:latin typeface="+mn-lt"/>
+                <a:ea typeface="+mn-ea"/>
+                <a:cs typeface="+mn-cs"/>
+              </a:defRPr>
+            </a:lvl6pPr>
+            <a:lvl7pPr marL="2743200" indent="0" algn="ctr" defTabSz="914400" rtl="0" eaLnBrk="1" latinLnBrk="0" hangingPunct="1">
+              <a:lnSpc>
+                <a:spcPct val="90000"/>
+              </a:lnSpc>
+              <a:spcBef>
+                <a:spcPts val="500"/>
+              </a:spcBef>
+              <a:buFont typeface="Arial" panose="020B0604020202020204" pitchFamily="34" charset="0"/>
+              <a:buNone/>
+              <a:defRPr sz="1600" kern="1200">
+                <a:solidFill>
+                  <a:schemeClr val="tx1"/>
+                </a:solidFill>
+                <a:latin typeface="+mn-lt"/>
+                <a:ea typeface="+mn-ea"/>
+                <a:cs typeface="+mn-cs"/>
+              </a:defRPr>
+            </a:lvl7pPr>
+            <a:lvl8pPr marL="3200400" indent="0" algn="ctr" defTabSz="914400" rtl="0" eaLnBrk="1" latinLnBrk="0" hangingPunct="1">
+              <a:lnSpc>
+                <a:spcPct val="90000"/>
+              </a:lnSpc>
+              <a:spcBef>
+                <a:spcPts val="500"/>
+              </a:spcBef>
+              <a:buFont typeface="Arial" panose="020B0604020202020204" pitchFamily="34" charset="0"/>
+              <a:buNone/>
+              <a:defRPr sz="1600" kern="1200">
+                <a:solidFill>
+                  <a:schemeClr val="tx1"/>
+                </a:solidFill>
+                <a:latin typeface="+mn-lt"/>
+                <a:ea typeface="+mn-ea"/>
+                <a:cs typeface="+mn-cs"/>
+              </a:defRPr>
+            </a:lvl8pPr>
+            <a:lvl9pPr marL="3657600" indent="0" algn="ctr" defTabSz="914400" rtl="0" eaLnBrk="1" latinLnBrk="0" hangingPunct="1">
+              <a:lnSpc>
+                <a:spcPct val="90000"/>
+              </a:lnSpc>
+              <a:spcBef>
+                <a:spcPts val="500"/>
+              </a:spcBef>
+              <a:buFont typeface="Arial" panose="020B0604020202020204" pitchFamily="34" charset="0"/>
+              <a:buNone/>
+              <a:defRPr sz="1600" kern="1200">
+                <a:solidFill>
+                  <a:schemeClr val="tx1"/>
+                </a:solidFill>
+                <a:latin typeface="+mn-lt"/>
+                <a:ea typeface="+mn-ea"/>
+                <a:cs typeface="+mn-cs"/>
+              </a:defRPr>
+            </a:lvl9pPr>
+          </a:lstStyle>
+          <a:p>
+            <a:pPr algn="l"/>
+            <a:r>
+              <a:rPr lang="en-GB" sz="2800" b="1" dirty="0"/>
+              <a:t>Horace Instrument view cut – Mantid instrument view with difference</a:t>
+            </a:r>
+          </a:p>
+          <a:p>
+            <a:pPr algn="l"/>
+            <a:endParaRPr lang="en-GB" sz="2800" dirty="0">
+              <a:solidFill>
+                <a:srgbClr val="0070C0"/>
+              </a:solidFill>
+            </a:endParaRPr>
+          </a:p>
+        </p:txBody>
+      </p:sp>
+      <p:sp>
+        <p:nvSpPr>
+          <p:cNvPr id="2" name="Rectangle 1">
+            <a:extLst>
+              <a:ext uri="{FF2B5EF4-FFF2-40B4-BE49-F238E27FC236}">
+                <a16:creationId xmlns:a16="http://schemas.microsoft.com/office/drawing/2014/main" id="{924F7C9F-6C85-6193-1CD2-2ED7D00099DC}"/>
+              </a:ext>
+            </a:extLst>
+          </p:cNvPr>
+          <p:cNvSpPr>
+            <a:spLocks noChangeArrowheads="1"/>
+          </p:cNvSpPr>
+          <p:nvPr/>
+        </p:nvSpPr>
+        <p:spPr bwMode="auto">
+          <a:xfrm>
+            <a:off x="549964" y="1517251"/>
+            <a:ext cx="11308597" cy="646331"/>
+          </a:xfrm>
+          <a:prstGeom prst="rect">
+            <a:avLst/>
+          </a:prstGeom>
+          <a:noFill/>
+          <a:ln>
+            <a:noFill/>
+          </a:ln>
+          <a:effectLst/>
+          <a:extLst>
+            <a:ext uri="{909E8E84-426E-40DD-AFC4-6F175D3DCCD1}">
+              <a14:hiddenFill xmlns:a14="http://schemas.microsoft.com/office/drawing/2010/main">
+                <a:solidFill>
+                  <a:schemeClr val="accent1"/>
+                </a:solidFill>
+              </a14:hiddenFill>
+            </a:ext>
+            <a:ext uri="{91240B29-F687-4F45-9708-019B960494DF}">
+              <a14:hiddenLine xmlns:a14="http://schemas.microsoft.com/office/drawing/2010/main" w="9525">
+                <a:solidFill>
+                  <a:schemeClr val="tx1"/>
+                </a:solidFill>
+                <a:miter lim="800000"/>
+                <a:headEnd/>
+                <a:tailEnd/>
+              </a14:hiddenLine>
+            </a:ext>
+            <a:ext uri="{AF507438-7753-43E0-B8FC-AC1667EBCBE1}">
+              <a14:hiddenEffects xmlns:a14="http://schemas.microsoft.com/office/drawing/2010/main">
+                <a:effectLst>
+                  <a:outerShdw dist="35921" dir="2700000" algn="ctr" rotWithShape="0">
+                    <a:schemeClr val="bg2"/>
+                  </a:outerShdw>
+                </a:effectLst>
+              </a14:hiddenEffects>
+            </a:ext>
+          </a:extLst>
+        </p:spPr>
+        <p:txBody>
+          <a:bodyPr vert="horz" wrap="square" lIns="91440" tIns="45720" rIns="91440" bIns="45720" numCol="1" anchor="ctr" anchorCtr="0" compatLnSpc="1">
+            <a:prstTxWarp prst="textNoShape">
+              <a:avLst/>
+            </a:prstTxWarp>
+            <a:spAutoFit/>
+          </a:bodyPr>
+          <a:lstStyle>
+            <a:lvl1pPr eaLnBrk="0" fontAlgn="base" hangingPunct="0">
+              <a:spcBef>
+                <a:spcPct val="30000"/>
+              </a:spcBef>
+              <a:spcAft>
+                <a:spcPct val="0"/>
+              </a:spcAft>
+              <a:defRPr sz="1200">
+                <a:solidFill>
+                  <a:schemeClr val="tx1"/>
+                </a:solidFill>
+                <a:latin typeface="Arial" panose="020B0604020202020204" pitchFamily="34" charset="0"/>
+              </a:defRPr>
+            </a:lvl1pPr>
+            <a:lvl2pPr eaLnBrk="0" fontAlgn="base" hangingPunct="0">
+              <a:spcBef>
+                <a:spcPct val="30000"/>
+              </a:spcBef>
+              <a:spcAft>
+                <a:spcPct val="0"/>
+              </a:spcAft>
+              <a:defRPr sz="1200">
+                <a:solidFill>
+                  <a:schemeClr val="tx1"/>
+                </a:solidFill>
+                <a:latin typeface="Arial" panose="020B0604020202020204" pitchFamily="34" charset="0"/>
+              </a:defRPr>
+            </a:lvl2pPr>
+            <a:lvl3pPr eaLnBrk="0" fontAlgn="base" hangingPunct="0">
+              <a:spcBef>
+                <a:spcPct val="30000"/>
+              </a:spcBef>
+              <a:spcAft>
+                <a:spcPct val="0"/>
+              </a:spcAft>
+              <a:defRPr sz="1200">
+                <a:solidFill>
+                  <a:schemeClr val="tx1"/>
+                </a:solidFill>
+                <a:latin typeface="Arial" panose="020B0604020202020204" pitchFamily="34" charset="0"/>
+              </a:defRPr>
+            </a:lvl3pPr>
+            <a:lvl4pPr eaLnBrk="0" fontAlgn="base" hangingPunct="0">
+              <a:spcBef>
+                <a:spcPct val="30000"/>
+              </a:spcBef>
+              <a:spcAft>
+                <a:spcPct val="0"/>
+              </a:spcAft>
+              <a:defRPr sz="1200">
+                <a:solidFill>
+                  <a:schemeClr val="tx1"/>
+                </a:solidFill>
+                <a:latin typeface="Arial" panose="020B0604020202020204" pitchFamily="34" charset="0"/>
+              </a:defRPr>
+            </a:lvl4pPr>
+            <a:lvl5pPr eaLnBrk="0" fontAlgn="base" hangingPunct="0">
+              <a:spcBef>
+                <a:spcPct val="30000"/>
+              </a:spcBef>
+              <a:spcAft>
+                <a:spcPct val="0"/>
+              </a:spcAft>
+              <a:defRPr sz="1200">
+                <a:solidFill>
+                  <a:schemeClr val="tx1"/>
+                </a:solidFill>
+                <a:latin typeface="Arial" panose="020B0604020202020204" pitchFamily="34" charset="0"/>
+              </a:defRPr>
+            </a:lvl5pPr>
+            <a:lvl6pPr eaLnBrk="0" fontAlgn="base" hangingPunct="0">
+              <a:spcBef>
+                <a:spcPct val="30000"/>
+              </a:spcBef>
+              <a:spcAft>
+                <a:spcPct val="0"/>
+              </a:spcAft>
+              <a:defRPr sz="1200">
+                <a:solidFill>
+                  <a:schemeClr val="tx1"/>
+                </a:solidFill>
+                <a:latin typeface="Arial" panose="020B0604020202020204" pitchFamily="34" charset="0"/>
+              </a:defRPr>
+            </a:lvl6pPr>
+            <a:lvl7pPr eaLnBrk="0" fontAlgn="base" hangingPunct="0">
+              <a:spcBef>
+                <a:spcPct val="30000"/>
+              </a:spcBef>
+              <a:spcAft>
+                <a:spcPct val="0"/>
+              </a:spcAft>
+              <a:defRPr sz="1200">
+                <a:solidFill>
+                  <a:schemeClr val="tx1"/>
+                </a:solidFill>
+                <a:latin typeface="Arial" panose="020B0604020202020204" pitchFamily="34" charset="0"/>
+              </a:defRPr>
+            </a:lvl7pPr>
+            <a:lvl8pPr eaLnBrk="0" fontAlgn="base" hangingPunct="0">
+              <a:spcBef>
+                <a:spcPct val="30000"/>
+              </a:spcBef>
+              <a:spcAft>
+                <a:spcPct val="0"/>
+              </a:spcAft>
+              <a:defRPr sz="1200">
+                <a:solidFill>
+                  <a:schemeClr val="tx1"/>
+                </a:solidFill>
+                <a:latin typeface="Arial" panose="020B0604020202020204" pitchFamily="34" charset="0"/>
+              </a:defRPr>
+            </a:lvl8pPr>
+            <a:lvl9pPr eaLnBrk="0" fontAlgn="base" hangingPunct="0">
+              <a:spcBef>
+                <a:spcPct val="30000"/>
+              </a:spcBef>
+              <a:spcAft>
+                <a:spcPct val="0"/>
+              </a:spcAft>
+              <a:defRPr sz="1200">
+                <a:solidFill>
+                  <a:schemeClr val="tx1"/>
+                </a:solidFill>
+                <a:latin typeface="Arial" panose="020B0604020202020204" pitchFamily="34" charset="0"/>
+              </a:defRPr>
+            </a:lvl9pPr>
+          </a:lstStyle>
+          <a:p>
+            <a:pPr marL="0" marR="0" lvl="0" indent="0" algn="l" defTabSz="914400" rtl="0" eaLnBrk="0" fontAlgn="base" latinLnBrk="0" hangingPunct="0">
+              <a:lnSpc>
+                <a:spcPct val="100000"/>
+              </a:lnSpc>
+              <a:spcBef>
+                <a:spcPct val="30000"/>
+              </a:spcBef>
+              <a:spcAft>
+                <a:spcPct val="0"/>
+              </a:spcAft>
+              <a:buClrTx/>
+              <a:buSzTx/>
+              <a:buFontTx/>
+              <a:buNone/>
+              <a:tabLst/>
+            </a:pPr>
+            <a:r>
+              <a:rPr kumimoji="0" lang="en-US" altLang="en-US" sz="1800" b="0" i="0" u="none" strike="noStrike" cap="none" normalizeH="0" baseline="0" dirty="0" err="1">
+                <a:ln>
+                  <a:noFill/>
+                </a:ln>
+                <a:solidFill>
+                  <a:schemeClr val="tx1"/>
+                </a:solidFill>
+                <a:effectLst/>
+                <a:latin typeface="Courier New" panose="02070309020205020404" pitchFamily="49" charset="0"/>
+                <a:cs typeface="Courier New" panose="02070309020205020404" pitchFamily="49" charset="0"/>
+              </a:rPr>
+              <a:t>wout</a:t>
+            </a:r>
+            <a:r>
+              <a:rPr kumimoji="0" lang="en-US" altLang="en-US" sz="1800" b="0" i="0" u="none" strike="noStrike" cap="none" normalizeH="0" baseline="0" dirty="0">
+                <a:ln>
+                  <a:noFill/>
+                </a:ln>
+                <a:solidFill>
+                  <a:schemeClr val="tx1"/>
+                </a:solidFill>
+                <a:effectLst/>
+                <a:latin typeface="Courier New" panose="02070309020205020404" pitchFamily="49" charset="0"/>
+                <a:cs typeface="Courier New" panose="02070309020205020404" pitchFamily="49" charset="0"/>
+              </a:rPr>
+              <a:t> = </a:t>
+            </a:r>
+            <a:r>
+              <a:rPr kumimoji="0" lang="en-US" altLang="en-US" sz="1800" b="0" i="0" u="none" strike="noStrike" cap="none" normalizeH="0" baseline="0" dirty="0" err="1">
+                <a:ln>
+                  <a:noFill/>
+                </a:ln>
+                <a:solidFill>
+                  <a:schemeClr val="accent3">
+                    <a:lumMod val="75000"/>
+                  </a:schemeClr>
+                </a:solidFill>
+                <a:effectLst/>
+                <a:latin typeface="Courier New" panose="02070309020205020404" pitchFamily="49" charset="0"/>
+                <a:cs typeface="Courier New" panose="02070309020205020404" pitchFamily="49" charset="0"/>
+              </a:rPr>
+              <a:t>instrument_view_cut</a:t>
+            </a:r>
+            <a:r>
+              <a:rPr kumimoji="0" lang="en-US" altLang="en-US" sz="1800" b="0" i="0" u="none" strike="noStrike" cap="none" normalizeH="0" baseline="0" dirty="0">
+                <a:ln>
+                  <a:noFill/>
+                </a:ln>
+                <a:solidFill>
+                  <a:schemeClr val="tx1"/>
+                </a:solidFill>
+                <a:effectLst/>
+                <a:latin typeface="Courier New" panose="02070309020205020404" pitchFamily="49" charset="0"/>
+                <a:cs typeface="Courier New" panose="02070309020205020404" pitchFamily="49" charset="0"/>
+              </a:rPr>
+              <a:t>(</a:t>
+            </a:r>
+            <a:r>
+              <a:rPr kumimoji="0" lang="en-US" altLang="en-US" sz="1800" b="0" i="0" u="none" strike="noStrike" cap="none" normalizeH="0" baseline="0" dirty="0" err="1">
+                <a:ln>
+                  <a:noFill/>
+                </a:ln>
+                <a:solidFill>
+                  <a:schemeClr val="tx1"/>
+                </a:solidFill>
+                <a:effectLst/>
+                <a:latin typeface="Courier New" panose="02070309020205020404" pitchFamily="49" charset="0"/>
+                <a:cs typeface="Courier New" panose="02070309020205020404" pitchFamily="49" charset="0"/>
+              </a:rPr>
+              <a:t>sqw_source</a:t>
+            </a:r>
+            <a:r>
+              <a:rPr kumimoji="0" lang="en-US" altLang="en-US" sz="1800" b="0" i="0" u="none" strike="noStrike" cap="none" normalizeH="0" baseline="0" dirty="0">
+                <a:ln>
+                  <a:noFill/>
+                </a:ln>
+                <a:solidFill>
+                  <a:schemeClr val="tx1"/>
+                </a:solidFill>
+                <a:effectLst/>
+                <a:latin typeface="Courier New" panose="02070309020205020404" pitchFamily="49" charset="0"/>
+                <a:cs typeface="Courier New" panose="02070309020205020404" pitchFamily="49" charset="0"/>
+              </a:rPr>
+              <a:t>,[0,theta_step,theta_max],[</a:t>
+            </a:r>
+            <a:r>
+              <a:rPr kumimoji="0" lang="en-US" altLang="en-US" sz="1800" b="0" i="0" u="none" strike="noStrike" cap="none" normalizeH="0" baseline="0" dirty="0" err="1">
+                <a:ln>
+                  <a:noFill/>
+                </a:ln>
+                <a:solidFill>
+                  <a:schemeClr val="tx1"/>
+                </a:solidFill>
+                <a:effectLst/>
+                <a:latin typeface="Courier New" panose="02070309020205020404" pitchFamily="49" charset="0"/>
+                <a:cs typeface="Courier New" panose="02070309020205020404" pitchFamily="49" charset="0"/>
+              </a:rPr>
+              <a:t>En_min,En_step,En_max</a:t>
+            </a:r>
+            <a:r>
+              <a:rPr kumimoji="0" lang="en-US" altLang="en-US" sz="1800" b="0" i="0" u="none" strike="noStrike" cap="none" normalizeH="0" baseline="0" dirty="0">
+                <a:ln>
+                  <a:noFill/>
+                </a:ln>
+                <a:solidFill>
+                  <a:schemeClr val="tx1"/>
+                </a:solidFill>
+                <a:effectLst/>
+                <a:latin typeface="Courier New" panose="02070309020205020404" pitchFamily="49" charset="0"/>
+                <a:cs typeface="Courier New" panose="02070309020205020404" pitchFamily="49" charset="0"/>
+              </a:rPr>
+              <a:t>]); </a:t>
+            </a:r>
+          </a:p>
+        </p:txBody>
+      </p:sp>
+      <p:pic>
+        <p:nvPicPr>
+          <p:cNvPr id="7" name="Picture 6" descr="A close-up of a graph">
+            <a:extLst>
+              <a:ext uri="{FF2B5EF4-FFF2-40B4-BE49-F238E27FC236}">
+                <a16:creationId xmlns:a16="http://schemas.microsoft.com/office/drawing/2014/main" id="{AC6466B4-B81C-4C96-D725-0714364D5B16}"/>
+              </a:ext>
+            </a:extLst>
+          </p:cNvPr>
+          <p:cNvPicPr>
+            <a:picLocks noChangeAspect="1"/>
+          </p:cNvPicPr>
+          <p:nvPr/>
+        </p:nvPicPr>
+        <p:blipFill>
+          <a:blip r:embed="rId2">
+            <a:extLst>
+              <a:ext uri="{28A0092B-C50C-407E-A947-70E740481C1C}">
+                <a14:useLocalDpi xmlns:a14="http://schemas.microsoft.com/office/drawing/2010/main" val="0"/>
+              </a:ext>
+            </a:extLst>
+          </a:blip>
+          <a:stretch>
+            <a:fillRect/>
+          </a:stretch>
+        </p:blipFill>
+        <p:spPr>
+          <a:xfrm>
+            <a:off x="708821" y="2326468"/>
+            <a:ext cx="10990881" cy="4411685"/>
+          </a:xfrm>
+          <a:prstGeom prst="rect">
+            <a:avLst/>
+          </a:prstGeom>
+        </p:spPr>
+      </p:pic>
+    </p:spTree>
+    <p:extLst>
+      <p:ext uri="{BB962C8B-B14F-4D97-AF65-F5344CB8AC3E}">
+        <p14:creationId xmlns:p14="http://schemas.microsoft.com/office/powerpoint/2010/main" val="1587325310"/>
+      </p:ext>
+    </p:extLst>
+  </p:cSld>
+  <p:clrMapOvr>
+    <a:masterClrMapping/>
+  </p:clrMapOvr>
+</p:sld>
+</file>
+
+<file path=ppt/slides/slide5.xml><?xml version="1.0" encoding="utf-8"?>
+<p:sld xmlns:a="http://schemas.openxmlformats.org/drawingml/2006/main" xmlns:r="http://schemas.openxmlformats.org/officeDocument/2006/relationships" xmlns:p="http://schemas.openxmlformats.org/presentationml/2006/main">
+  <p:cSld>
+    <p:spTree>
+      <p:nvGrpSpPr>
+        <p:cNvPr id="1" name="">
+          <a:extLst>
+            <a:ext uri="{FF2B5EF4-FFF2-40B4-BE49-F238E27FC236}">
+              <a16:creationId xmlns:a16="http://schemas.microsoft.com/office/drawing/2014/main" id="{D00346FD-1B7D-2365-A34A-4595ECB2610A}"/>
+            </a:ext>
+          </a:extLst>
+        </p:cNvPr>
+        <p:cNvGrpSpPr/>
+        <p:nvPr/>
+      </p:nvGrpSpPr>
+      <p:grpSpPr>
+        <a:xfrm>
+          <a:off x="0" y="0"/>
+          <a:ext cx="0" cy="0"/>
+          <a:chOff x="0" y="0"/>
+          <a:chExt cx="0" cy="0"/>
+        </a:xfrm>
+      </p:grpSpPr>
+      <p:sp>
+        <p:nvSpPr>
+          <p:cNvPr id="3" name="Subtitle 2">
+            <a:extLst>
+              <a:ext uri="{FF2B5EF4-FFF2-40B4-BE49-F238E27FC236}">
+                <a16:creationId xmlns:a16="http://schemas.microsoft.com/office/drawing/2014/main" id="{2CAFFEFD-75E6-C67C-DCAD-8412FBDF9DB0}"/>
+              </a:ext>
+            </a:extLst>
+          </p:cNvPr>
+          <p:cNvSpPr>
+            <a:spLocks noGrp="1"/>
+          </p:cNvSpPr>
+          <p:nvPr>
+            <p:ph type="subTitle" idx="1"/>
+          </p:nvPr>
+        </p:nvSpPr>
+        <p:spPr>
+          <a:xfrm>
+            <a:off x="624874" y="119847"/>
+            <a:ext cx="10290313" cy="757927"/>
+          </a:xfrm>
+        </p:spPr>
+        <p:txBody>
+          <a:bodyPr>
+            <a:noAutofit/>
+          </a:bodyPr>
+          <a:lstStyle/>
+          <a:p>
+            <a:r>
+              <a:rPr lang="en-GB" sz="2800" dirty="0"/>
+              <a:t>Horace 4 issues from user experience and Horace 4.1 highlights</a:t>
+            </a:r>
+          </a:p>
+        </p:txBody>
+      </p:sp>
+      <p:sp>
+        <p:nvSpPr>
+          <p:cNvPr id="4" name="Subtitle 2">
+            <a:extLst>
+              <a:ext uri="{FF2B5EF4-FFF2-40B4-BE49-F238E27FC236}">
+                <a16:creationId xmlns:a16="http://schemas.microsoft.com/office/drawing/2014/main" id="{BE097F33-8571-7C21-BED0-0507CC977DC6}"/>
+              </a:ext>
+            </a:extLst>
+          </p:cNvPr>
+          <p:cNvSpPr txBox="1">
+            <a:spLocks/>
+          </p:cNvSpPr>
+          <p:nvPr/>
+        </p:nvSpPr>
+        <p:spPr>
+          <a:xfrm>
+            <a:off x="490329" y="759324"/>
+            <a:ext cx="11427868" cy="516835"/>
+          </a:xfrm>
+          <a:prstGeom prst="rect">
+            <a:avLst/>
+          </a:prstGeom>
+        </p:spPr>
+        <p:txBody>
+          <a:bodyPr vert="horz" lIns="91440" tIns="45720" rIns="91440" bIns="45720" rtlCol="0">
+            <a:noAutofit/>
+          </a:bodyPr>
+          <a:lstStyle>
+            <a:lvl1pPr marL="0" indent="0" algn="ctr" defTabSz="914400" rtl="0" eaLnBrk="1" latinLnBrk="0" hangingPunct="1">
+              <a:lnSpc>
+                <a:spcPct val="90000"/>
+              </a:lnSpc>
+              <a:spcBef>
+                <a:spcPts val="1000"/>
+              </a:spcBef>
+              <a:buFont typeface="Arial" panose="020B0604020202020204" pitchFamily="34" charset="0"/>
+              <a:buNone/>
+              <a:defRPr sz="2400" kern="1200">
+                <a:solidFill>
+                  <a:schemeClr val="tx1"/>
+                </a:solidFill>
+                <a:latin typeface="+mn-lt"/>
+                <a:ea typeface="+mn-ea"/>
+                <a:cs typeface="+mn-cs"/>
+              </a:defRPr>
+            </a:lvl1pPr>
+            <a:lvl2pPr marL="457200" indent="0" algn="ctr" defTabSz="914400" rtl="0" eaLnBrk="1" latinLnBrk="0" hangingPunct="1">
+              <a:lnSpc>
+                <a:spcPct val="90000"/>
+              </a:lnSpc>
+              <a:spcBef>
+                <a:spcPts val="500"/>
+              </a:spcBef>
+              <a:buFont typeface="Arial" panose="020B0604020202020204" pitchFamily="34" charset="0"/>
+              <a:buNone/>
+              <a:defRPr sz="2000" kern="1200">
+                <a:solidFill>
+                  <a:schemeClr val="tx1"/>
+                </a:solidFill>
+                <a:latin typeface="+mn-lt"/>
+                <a:ea typeface="+mn-ea"/>
+                <a:cs typeface="+mn-cs"/>
+              </a:defRPr>
+            </a:lvl2pPr>
+            <a:lvl3pPr marL="914400" indent="0" algn="ctr" defTabSz="914400" rtl="0" eaLnBrk="1" latinLnBrk="0" hangingPunct="1">
+              <a:lnSpc>
+                <a:spcPct val="90000"/>
+              </a:lnSpc>
+              <a:spcBef>
+                <a:spcPts val="500"/>
+              </a:spcBef>
+              <a:buFont typeface="Arial" panose="020B0604020202020204" pitchFamily="34" charset="0"/>
+              <a:buNone/>
+              <a:defRPr sz="1800" kern="1200">
+                <a:solidFill>
+                  <a:schemeClr val="tx1"/>
+                </a:solidFill>
+                <a:latin typeface="+mn-lt"/>
+                <a:ea typeface="+mn-ea"/>
+                <a:cs typeface="+mn-cs"/>
+              </a:defRPr>
+            </a:lvl3pPr>
+            <a:lvl4pPr marL="1371600" indent="0" algn="ctr" defTabSz="914400" rtl="0" eaLnBrk="1" latinLnBrk="0" hangingPunct="1">
+              <a:lnSpc>
+                <a:spcPct val="90000"/>
+              </a:lnSpc>
+              <a:spcBef>
+                <a:spcPts val="500"/>
+              </a:spcBef>
+              <a:buFont typeface="Arial" panose="020B0604020202020204" pitchFamily="34" charset="0"/>
+              <a:buNone/>
+              <a:defRPr sz="1600" kern="1200">
+                <a:solidFill>
+                  <a:schemeClr val="tx1"/>
+                </a:solidFill>
+                <a:latin typeface="+mn-lt"/>
+                <a:ea typeface="+mn-ea"/>
+                <a:cs typeface="+mn-cs"/>
+              </a:defRPr>
+            </a:lvl4pPr>
+            <a:lvl5pPr marL="1828800" indent="0" algn="ctr" defTabSz="914400" rtl="0" eaLnBrk="1" latinLnBrk="0" hangingPunct="1">
+              <a:lnSpc>
+                <a:spcPct val="90000"/>
+              </a:lnSpc>
+              <a:spcBef>
+                <a:spcPts val="500"/>
+              </a:spcBef>
+              <a:buFont typeface="Arial" panose="020B0604020202020204" pitchFamily="34" charset="0"/>
+              <a:buNone/>
+              <a:defRPr sz="1600" kern="1200">
+                <a:solidFill>
+                  <a:schemeClr val="tx1"/>
+                </a:solidFill>
+                <a:latin typeface="+mn-lt"/>
+                <a:ea typeface="+mn-ea"/>
+                <a:cs typeface="+mn-cs"/>
+              </a:defRPr>
+            </a:lvl5pPr>
+            <a:lvl6pPr marL="2286000" indent="0" algn="ctr" defTabSz="914400" rtl="0" eaLnBrk="1" latinLnBrk="0" hangingPunct="1">
+              <a:lnSpc>
+                <a:spcPct val="90000"/>
+              </a:lnSpc>
+              <a:spcBef>
+                <a:spcPts val="500"/>
+              </a:spcBef>
+              <a:buFont typeface="Arial" panose="020B0604020202020204" pitchFamily="34" charset="0"/>
+              <a:buNone/>
+              <a:defRPr sz="1600" kern="1200">
+                <a:solidFill>
+                  <a:schemeClr val="tx1"/>
+                </a:solidFill>
+                <a:latin typeface="+mn-lt"/>
+                <a:ea typeface="+mn-ea"/>
+                <a:cs typeface="+mn-cs"/>
+              </a:defRPr>
+            </a:lvl6pPr>
+            <a:lvl7pPr marL="2743200" indent="0" algn="ctr" defTabSz="914400" rtl="0" eaLnBrk="1" latinLnBrk="0" hangingPunct="1">
+              <a:lnSpc>
+                <a:spcPct val="90000"/>
+              </a:lnSpc>
+              <a:spcBef>
+                <a:spcPts val="500"/>
+              </a:spcBef>
+              <a:buFont typeface="Arial" panose="020B0604020202020204" pitchFamily="34" charset="0"/>
+              <a:buNone/>
+              <a:defRPr sz="1600" kern="1200">
+                <a:solidFill>
+                  <a:schemeClr val="tx1"/>
+                </a:solidFill>
+                <a:latin typeface="+mn-lt"/>
+                <a:ea typeface="+mn-ea"/>
+                <a:cs typeface="+mn-cs"/>
+              </a:defRPr>
+            </a:lvl7pPr>
+            <a:lvl8pPr marL="3200400" indent="0" algn="ctr" defTabSz="914400" rtl="0" eaLnBrk="1" latinLnBrk="0" hangingPunct="1">
+              <a:lnSpc>
+                <a:spcPct val="90000"/>
+              </a:lnSpc>
+              <a:spcBef>
+                <a:spcPts val="500"/>
+              </a:spcBef>
+              <a:buFont typeface="Arial" panose="020B0604020202020204" pitchFamily="34" charset="0"/>
+              <a:buNone/>
+              <a:defRPr sz="1600" kern="1200">
+                <a:solidFill>
+                  <a:schemeClr val="tx1"/>
+                </a:solidFill>
+                <a:latin typeface="+mn-lt"/>
+                <a:ea typeface="+mn-ea"/>
+                <a:cs typeface="+mn-cs"/>
+              </a:defRPr>
+            </a:lvl8pPr>
+            <a:lvl9pPr marL="3657600" indent="0" algn="ctr" defTabSz="914400" rtl="0" eaLnBrk="1" latinLnBrk="0" hangingPunct="1">
+              <a:lnSpc>
+                <a:spcPct val="90000"/>
+              </a:lnSpc>
+              <a:spcBef>
+                <a:spcPts val="500"/>
+              </a:spcBef>
+              <a:buFont typeface="Arial" panose="020B0604020202020204" pitchFamily="34" charset="0"/>
+              <a:buNone/>
+              <a:defRPr sz="1600" kern="1200">
+                <a:solidFill>
+                  <a:schemeClr val="tx1"/>
+                </a:solidFill>
+                <a:latin typeface="+mn-lt"/>
+                <a:ea typeface="+mn-ea"/>
+                <a:cs typeface="+mn-cs"/>
+              </a:defRPr>
+            </a:lvl9pPr>
+          </a:lstStyle>
+          <a:p>
+            <a:pPr algn="l"/>
+            <a:r>
+              <a:rPr lang="en-GB" sz="2800" b="1" dirty="0"/>
+              <a:t>Horace Instrument view cut – Mantid instrument view with difference</a:t>
+            </a:r>
+          </a:p>
+          <a:p>
+            <a:pPr algn="l"/>
+            <a:endParaRPr lang="en-GB" sz="2800" dirty="0">
+              <a:solidFill>
+                <a:srgbClr val="0070C0"/>
+              </a:solidFill>
+            </a:endParaRPr>
+          </a:p>
+        </p:txBody>
+      </p:sp>
+    </p:spTree>
+    <p:extLst>
+      <p:ext uri="{BB962C8B-B14F-4D97-AF65-F5344CB8AC3E}">
+        <p14:creationId xmlns:p14="http://schemas.microsoft.com/office/powerpoint/2010/main" val="171458788"/>
       </p:ext>
     </p:extLst>
   </p:cSld>

</xml_diff>